<commit_message>
push all files about project week3
</commit_message>
<xml_diff>
--- a/Week3/6-11-2020/zwallet-presentation-2.pptx
+++ b/Week3/6-11-2020/zwallet-presentation-2.pptx
@@ -11401,42 +11401,6 @@
           </a:p>
         </p:txBody>
       </p:sp>
-      <p:pic>
-        <p:nvPicPr>
-          <p:cNvPr id="9" name="Picture 8">
-            <a:extLst>
-              <a:ext uri="{FF2B5EF4-FFF2-40B4-BE49-F238E27FC236}">
-                <a16:creationId xmlns:a16="http://schemas.microsoft.com/office/drawing/2014/main" id="{E2785EFE-4095-4595-B861-D8F3FA7600DB}"/>
-              </a:ext>
-            </a:extLst>
-          </p:cNvPr>
-          <p:cNvPicPr>
-            <a:picLocks noChangeAspect="1"/>
-          </p:cNvPicPr>
-          <p:nvPr/>
-        </p:nvPicPr>
-        <p:blipFill>
-          <a:blip r:embed="rId2">
-            <a:extLst>
-              <a:ext uri="{28A0092B-C50C-407E-A947-70E740481C1C}">
-                <a14:useLocalDpi xmlns:a14="http://schemas.microsoft.com/office/drawing/2010/main" val="0"/>
-              </a:ext>
-            </a:extLst>
-          </a:blip>
-          <a:stretch>
-            <a:fillRect/>
-          </a:stretch>
-        </p:blipFill>
-        <p:spPr>
-          <a:xfrm>
-            <a:off x="9067801" y="3923271"/>
-            <a:ext cx="2438400" cy="2438400"/>
-          </a:xfrm>
-          <a:prstGeom prst="rect">
-            <a:avLst/>
-          </a:prstGeom>
-        </p:spPr>
-      </p:pic>
       <p:sp>
         <p:nvSpPr>
           <p:cNvPr id="2" name="TextBox 1">
@@ -11722,7 +11686,7 @@
           <p:nvPr/>
         </p:nvPicPr>
         <p:blipFill>
-          <a:blip r:embed="rId3">
+          <a:blip r:embed="rId2">
             <a:extLst>
               <a:ext uri="{28A0092B-C50C-407E-A947-70E740481C1C}">
                 <a14:useLocalDpi xmlns:a14="http://schemas.microsoft.com/office/drawing/2010/main" val="0"/>
@@ -11758,7 +11722,7 @@
           <p:nvPr/>
         </p:nvPicPr>
         <p:blipFill>
-          <a:blip r:embed="rId4">
+          <a:blip r:embed="rId3">
             <a:extLst>
               <a:ext uri="{28A0092B-C50C-407E-A947-70E740481C1C}">
                 <a14:useLocalDpi xmlns:a14="http://schemas.microsoft.com/office/drawing/2010/main" val="0"/>
@@ -11794,7 +11758,7 @@
           <p:nvPr/>
         </p:nvPicPr>
         <p:blipFill>
-          <a:blip r:embed="rId5">
+          <a:blip r:embed="rId4">
             <a:extLst>
               <a:ext uri="{28A0092B-C50C-407E-A947-70E740481C1C}">
                 <a14:useLocalDpi xmlns:a14="http://schemas.microsoft.com/office/drawing/2010/main" val="0"/>

</xml_diff>